<commit_message>
Implemented wait op code
</commit_message>
<xml_diff>
--- a/Documentation/Pulse Programmer Documentation.pptx
+++ b/Documentation/Pulse Programmer Documentation.pptx
@@ -9,7 +9,8 @@
     <p:sldId id="257" r:id="rId3"/>
     <p:sldId id="259" r:id="rId4"/>
     <p:sldId id="260" r:id="rId5"/>
-    <p:sldId id="258" r:id="rId6"/>
+    <p:sldId id="261" r:id="rId6"/>
+    <p:sldId id="258" r:id="rId7"/>
   </p:sldIdLst>
   <p:sldSz cx="12192000" cy="6858000"/>
   <p:notesSz cx="6858000" cy="9144000"/>
@@ -263,7 +264,7 @@
           <a:p>
             <a:fld id="{2E7CC9F0-B487-409B-B9EC-A5FEB68BFF69}" type="datetimeFigureOut">
               <a:rPr lang="en-US" smtClean="0"/>
-              <a:t>12/17/2024</a:t>
+              <a:t>12/18/2024</a:t>
             </a:fld>
             <a:endParaRPr lang="en-US"/>
           </a:p>
@@ -461,7 +462,7 @@
           <a:p>
             <a:fld id="{2E7CC9F0-B487-409B-B9EC-A5FEB68BFF69}" type="datetimeFigureOut">
               <a:rPr lang="en-US" smtClean="0"/>
-              <a:t>12/17/2024</a:t>
+              <a:t>12/18/2024</a:t>
             </a:fld>
             <a:endParaRPr lang="en-US"/>
           </a:p>
@@ -669,7 +670,7 @@
           <a:p>
             <a:fld id="{2E7CC9F0-B487-409B-B9EC-A5FEB68BFF69}" type="datetimeFigureOut">
               <a:rPr lang="en-US" smtClean="0"/>
-              <a:t>12/17/2024</a:t>
+              <a:t>12/18/2024</a:t>
             </a:fld>
             <a:endParaRPr lang="en-US"/>
           </a:p>
@@ -867,7 +868,7 @@
           <a:p>
             <a:fld id="{2E7CC9F0-B487-409B-B9EC-A5FEB68BFF69}" type="datetimeFigureOut">
               <a:rPr lang="en-US" smtClean="0"/>
-              <a:t>12/17/2024</a:t>
+              <a:t>12/18/2024</a:t>
             </a:fld>
             <a:endParaRPr lang="en-US"/>
           </a:p>
@@ -1142,7 +1143,7 @@
           <a:p>
             <a:fld id="{2E7CC9F0-B487-409B-B9EC-A5FEB68BFF69}" type="datetimeFigureOut">
               <a:rPr lang="en-US" smtClean="0"/>
-              <a:t>12/17/2024</a:t>
+              <a:t>12/18/2024</a:t>
             </a:fld>
             <a:endParaRPr lang="en-US"/>
           </a:p>
@@ -1407,7 +1408,7 @@
           <a:p>
             <a:fld id="{2E7CC9F0-B487-409B-B9EC-A5FEB68BFF69}" type="datetimeFigureOut">
               <a:rPr lang="en-US" smtClean="0"/>
-              <a:t>12/17/2024</a:t>
+              <a:t>12/18/2024</a:t>
             </a:fld>
             <a:endParaRPr lang="en-US"/>
           </a:p>
@@ -1819,7 +1820,7 @@
           <a:p>
             <a:fld id="{2E7CC9F0-B487-409B-B9EC-A5FEB68BFF69}" type="datetimeFigureOut">
               <a:rPr lang="en-US" smtClean="0"/>
-              <a:t>12/17/2024</a:t>
+              <a:t>12/18/2024</a:t>
             </a:fld>
             <a:endParaRPr lang="en-US"/>
           </a:p>
@@ -1960,7 +1961,7 @@
           <a:p>
             <a:fld id="{2E7CC9F0-B487-409B-B9EC-A5FEB68BFF69}" type="datetimeFigureOut">
               <a:rPr lang="en-US" smtClean="0"/>
-              <a:t>12/17/2024</a:t>
+              <a:t>12/18/2024</a:t>
             </a:fld>
             <a:endParaRPr lang="en-US"/>
           </a:p>
@@ -2073,7 +2074,7 @@
           <a:p>
             <a:fld id="{2E7CC9F0-B487-409B-B9EC-A5FEB68BFF69}" type="datetimeFigureOut">
               <a:rPr lang="en-US" smtClean="0"/>
-              <a:t>12/17/2024</a:t>
+              <a:t>12/18/2024</a:t>
             </a:fld>
             <a:endParaRPr lang="en-US"/>
           </a:p>
@@ -2384,7 +2385,7 @@
           <a:p>
             <a:fld id="{2E7CC9F0-B487-409B-B9EC-A5FEB68BFF69}" type="datetimeFigureOut">
               <a:rPr lang="en-US" smtClean="0"/>
-              <a:t>12/17/2024</a:t>
+              <a:t>12/18/2024</a:t>
             </a:fld>
             <a:endParaRPr lang="en-US"/>
           </a:p>
@@ -2672,7 +2673,7 @@
           <a:p>
             <a:fld id="{2E7CC9F0-B487-409B-B9EC-A5FEB68BFF69}" type="datetimeFigureOut">
               <a:rPr lang="en-US" smtClean="0"/>
-              <a:t>12/17/2024</a:t>
+              <a:t>12/18/2024</a:t>
             </a:fld>
             <a:endParaRPr lang="en-US"/>
           </a:p>
@@ -2913,7 +2914,7 @@
           <a:p>
             <a:fld id="{2E7CC9F0-B487-409B-B9EC-A5FEB68BFF69}" type="datetimeFigureOut">
               <a:rPr lang="en-US" smtClean="0"/>
-              <a:t>12/17/2024</a:t>
+              <a:t>12/18/2024</a:t>
             </a:fld>
             <a:endParaRPr lang="en-US"/>
           </a:p>
@@ -3772,6 +3773,119 @@
 </file>
 
 <file path=ppt/slides/slide5.xml><?xml version="1.0" encoding="utf-8"?>
+<p:sld xmlns:a="http://schemas.openxmlformats.org/drawingml/2006/main" xmlns:r="http://schemas.openxmlformats.org/officeDocument/2006/relationships" xmlns:p="http://schemas.openxmlformats.org/presentationml/2006/main">
+  <p:cSld>
+    <p:spTree>
+      <p:nvGrpSpPr>
+        <p:cNvPr id="1" name=""/>
+        <p:cNvGrpSpPr/>
+        <p:nvPr/>
+      </p:nvGrpSpPr>
+      <p:grpSpPr>
+        <a:xfrm>
+          <a:off x="0" y="0"/>
+          <a:ext cx="0" cy="0"/>
+          <a:chOff x="0" y="0"/>
+          <a:chExt cx="0" cy="0"/>
+        </a:xfrm>
+      </p:grpSpPr>
+      <p:sp>
+        <p:nvSpPr>
+          <p:cNvPr id="2" name="Title 1">
+            <a:extLst>
+              <a:ext uri="{FF2B5EF4-FFF2-40B4-BE49-F238E27FC236}">
+                <a16:creationId xmlns:a16="http://schemas.microsoft.com/office/drawing/2014/main" id="{45CAC404-D806-6C8D-A657-2B7AB09A4430}"/>
+              </a:ext>
+            </a:extLst>
+          </p:cNvPr>
+          <p:cNvSpPr>
+            <a:spLocks noGrp="1"/>
+          </p:cNvSpPr>
+          <p:nvPr>
+            <p:ph type="title"/>
+          </p:nvPr>
+        </p:nvSpPr>
+        <p:spPr/>
+        <p:txBody>
+          <a:bodyPr/>
+          <a:lstStyle/>
+          <a:p>
+            <a:r>
+              <a:rPr lang="en-US" dirty="0"/>
+              <a:t>Op Codes</a:t>
+            </a:r>
+          </a:p>
+        </p:txBody>
+      </p:sp>
+      <p:sp>
+        <p:nvSpPr>
+          <p:cNvPr id="3" name="Content Placeholder 2">
+            <a:extLst>
+              <a:ext uri="{FF2B5EF4-FFF2-40B4-BE49-F238E27FC236}">
+                <a16:creationId xmlns:a16="http://schemas.microsoft.com/office/drawing/2014/main" id="{C394C9DA-22D7-AB79-1A15-3A2ECD340413}"/>
+              </a:ext>
+            </a:extLst>
+          </p:cNvPr>
+          <p:cNvSpPr>
+            <a:spLocks noGrp="1"/>
+          </p:cNvSpPr>
+          <p:nvPr>
+            <p:ph idx="1"/>
+          </p:nvPr>
+        </p:nvSpPr>
+        <p:spPr/>
+        <p:txBody>
+          <a:bodyPr/>
+          <a:lstStyle/>
+          <a:p>
+            <a:r>
+              <a:rPr lang="en-US" dirty="0"/>
+              <a:t>0 = No OP</a:t>
+            </a:r>
+          </a:p>
+          <a:p>
+            <a:r>
+              <a:rPr lang="en-US" dirty="0"/>
+              <a:t>1 = DELAY</a:t>
+            </a:r>
+          </a:p>
+          <a:p>
+            <a:r>
+              <a:rPr lang="en-US" dirty="0"/>
+              <a:t>2 = LONG DELAY (Not Implemented)</a:t>
+            </a:r>
+          </a:p>
+          <a:p>
+            <a:r>
+              <a:rPr lang="en-US" dirty="0"/>
+              <a:t>3 = GOTO (Not Implemented)</a:t>
+            </a:r>
+          </a:p>
+          <a:p>
+            <a:r>
+              <a:rPr lang="en-US" dirty="0"/>
+              <a:t>4 = WAIT</a:t>
+            </a:r>
+          </a:p>
+          <a:p>
+            <a:endParaRPr lang="en-US" dirty="0"/>
+          </a:p>
+        </p:txBody>
+      </p:sp>
+    </p:spTree>
+    <p:extLst>
+      <p:ext uri="{BB962C8B-B14F-4D97-AF65-F5344CB8AC3E}">
+        <p14:creationId xmlns:p14="http://schemas.microsoft.com/office/powerpoint/2010/main" val="4279889304"/>
+      </p:ext>
+    </p:extLst>
+  </p:cSld>
+  <p:clrMapOvr>
+    <a:masterClrMapping/>
+  </p:clrMapOvr>
+</p:sld>
+</file>
+
+<file path=ppt/slides/slide6.xml><?xml version="1.0" encoding="utf-8"?>
 <p:sld xmlns:a="http://schemas.openxmlformats.org/drawingml/2006/main" xmlns:r="http://schemas.openxmlformats.org/officeDocument/2006/relationships" xmlns:p="http://schemas.openxmlformats.org/presentationml/2006/main">
   <p:cSld>
     <p:spTree>

</xml_diff>

<commit_message>
Adding GOTO op code
</commit_message>
<xml_diff>
--- a/Documentation/Pulse Programmer Documentation.pptx
+++ b/Documentation/Pulse Programmer Documentation.pptx
@@ -10,7 +10,8 @@
     <p:sldId id="259" r:id="rId4"/>
     <p:sldId id="260" r:id="rId5"/>
     <p:sldId id="261" r:id="rId6"/>
-    <p:sldId id="258" r:id="rId7"/>
+    <p:sldId id="262" r:id="rId7"/>
+    <p:sldId id="258" r:id="rId8"/>
   </p:sldIdLst>
   <p:sldSz cx="12192000" cy="6858000"/>
   <p:notesSz cx="6858000" cy="9144000"/>
@@ -3707,19 +3708,19 @@
             </a:r>
             <a:r>
               <a:rPr lang="en-US" sz="800" dirty="0"/>
-              <a:t>	|	pulse	|	data	|	DDS	|	op code	|	delay</a:t>
+              <a:t>	|	pulse	|	DDS 	|	data 	|	op code	|	delay</a:t>
             </a:r>
           </a:p>
           <a:p>
             <a:r>
               <a:rPr lang="en-US" sz="800" dirty="0"/>
-              <a:t>4-bit	|	12-bit	|	8-bit	|	12-bit	|	8-bit	|	4-bit	|	32-bit</a:t>
+              <a:t>4-bit	|	12-bit	|	8-bit	|	8-bit	|	12-bit 	|	4-bit	|	32-bit</a:t>
             </a:r>
           </a:p>
           <a:p>
             <a:r>
               <a:rPr lang="en-US" sz="800" dirty="0"/>
-              <a:t>[79:76]	|	[75:64]	|	[63:56]	|	[55:44]	|	[43:36]	|	[35:32]	|	[31:0]</a:t>
+              <a:t>[79:76]	|	[75:64]	|	[63:56]	|	 [55:48] 	|	[47:36] 	|	[35:32]	|	[31:0]</a:t>
             </a:r>
           </a:p>
         </p:txBody>
@@ -3886,6 +3887,130 @@
 </file>
 
 <file path=ppt/slides/slide6.xml><?xml version="1.0" encoding="utf-8"?>
+<p:sld xmlns:a="http://schemas.openxmlformats.org/drawingml/2006/main" xmlns:r="http://schemas.openxmlformats.org/officeDocument/2006/relationships" xmlns:p="http://schemas.openxmlformats.org/presentationml/2006/main">
+  <p:cSld>
+    <p:spTree>
+      <p:nvGrpSpPr>
+        <p:cNvPr id="1" name=""/>
+        <p:cNvGrpSpPr/>
+        <p:nvPr/>
+      </p:nvGrpSpPr>
+      <p:grpSpPr>
+        <a:xfrm>
+          <a:off x="0" y="0"/>
+          <a:ext cx="0" cy="0"/>
+          <a:chOff x="0" y="0"/>
+          <a:chExt cx="0" cy="0"/>
+        </a:xfrm>
+      </p:grpSpPr>
+      <p:sp>
+        <p:nvSpPr>
+          <p:cNvPr id="2" name="Title 1">
+            <a:extLst>
+              <a:ext uri="{FF2B5EF4-FFF2-40B4-BE49-F238E27FC236}">
+                <a16:creationId xmlns:a16="http://schemas.microsoft.com/office/drawing/2014/main" id="{8984A156-FE75-3D8F-9580-18E11DDB2DE3}"/>
+              </a:ext>
+            </a:extLst>
+          </p:cNvPr>
+          <p:cNvSpPr>
+            <a:spLocks noGrp="1"/>
+          </p:cNvSpPr>
+          <p:nvPr>
+            <p:ph type="title"/>
+          </p:nvPr>
+        </p:nvSpPr>
+        <p:spPr/>
+        <p:txBody>
+          <a:bodyPr/>
+          <a:lstStyle/>
+          <a:p>
+            <a:r>
+              <a:rPr lang="en-US" dirty="0"/>
+              <a:t>UART Commands</a:t>
+            </a:r>
+          </a:p>
+        </p:txBody>
+      </p:sp>
+      <p:sp>
+        <p:nvSpPr>
+          <p:cNvPr id="3" name="Content Placeholder 2">
+            <a:extLst>
+              <a:ext uri="{FF2B5EF4-FFF2-40B4-BE49-F238E27FC236}">
+                <a16:creationId xmlns:a16="http://schemas.microsoft.com/office/drawing/2014/main" id="{48DDE207-E5E1-8F55-50FB-24AC2722C9A8}"/>
+              </a:ext>
+            </a:extLst>
+          </p:cNvPr>
+          <p:cNvSpPr>
+            <a:spLocks noGrp="1"/>
+          </p:cNvSpPr>
+          <p:nvPr>
+            <p:ph idx="1"/>
+          </p:nvPr>
+        </p:nvSpPr>
+        <p:spPr/>
+        <p:txBody>
+          <a:bodyPr/>
+          <a:lstStyle/>
+          <a:p>
+            <a:r>
+              <a:rPr lang="en-US" dirty="0"/>
+              <a:t>Currently 10 bytes must be transmitted at a time. Should </a:t>
+            </a:r>
+            <a:r>
+              <a:rPr lang="en-US"/>
+              <a:t>add timeout</a:t>
+            </a:r>
+            <a:endParaRPr lang="en-US" dirty="0"/>
+          </a:p>
+          <a:p>
+            <a:endParaRPr lang="en-US" dirty="0"/>
+          </a:p>
+          <a:p>
+            <a:r>
+              <a:rPr lang="en-US" dirty="0"/>
+              <a:t>0 = Read from RAM</a:t>
+            </a:r>
+          </a:p>
+          <a:p>
+            <a:r>
+              <a:rPr lang="en-US" dirty="0"/>
+              <a:t>1 = Write to RAM</a:t>
+            </a:r>
+          </a:p>
+          <a:p>
+            <a:r>
+              <a:rPr lang="en-US" dirty="0"/>
+              <a:t>2 = Start</a:t>
+            </a:r>
+          </a:p>
+          <a:p>
+            <a:r>
+              <a:rPr lang="en-US" dirty="0"/>
+              <a:t>3 = Stop</a:t>
+            </a:r>
+          </a:p>
+          <a:p>
+            <a:r>
+              <a:rPr lang="en-US" dirty="0"/>
+              <a:t>4 = </a:t>
+            </a:r>
+          </a:p>
+        </p:txBody>
+      </p:sp>
+    </p:spTree>
+    <p:extLst>
+      <p:ext uri="{BB962C8B-B14F-4D97-AF65-F5344CB8AC3E}">
+        <p14:creationId xmlns:p14="http://schemas.microsoft.com/office/powerpoint/2010/main" val="3518080426"/>
+      </p:ext>
+    </p:extLst>
+  </p:cSld>
+  <p:clrMapOvr>
+    <a:masterClrMapping/>
+  </p:clrMapOvr>
+</p:sld>
+</file>
+
+<file path=ppt/slides/slide7.xml><?xml version="1.0" encoding="utf-8"?>
 <p:sld xmlns:a="http://schemas.openxmlformats.org/drawingml/2006/main" xmlns:r="http://schemas.openxmlformats.org/officeDocument/2006/relationships" xmlns:p="http://schemas.openxmlformats.org/presentationml/2006/main">
   <p:cSld>
     <p:spTree>

</xml_diff>

<commit_message>
Implementing Long delay op code
</commit_message>
<xml_diff>
--- a/Documentation/Pulse Programmer Documentation.pptx
+++ b/Documentation/Pulse Programmer Documentation.pptx
@@ -265,7 +265,7 @@
           <a:p>
             <a:fld id="{2E7CC9F0-B487-409B-B9EC-A5FEB68BFF69}" type="datetimeFigureOut">
               <a:rPr lang="en-US" smtClean="0"/>
-              <a:t>12/18/2024</a:t>
+              <a:t>12/19/2024</a:t>
             </a:fld>
             <a:endParaRPr lang="en-US"/>
           </a:p>
@@ -463,7 +463,7 @@
           <a:p>
             <a:fld id="{2E7CC9F0-B487-409B-B9EC-A5FEB68BFF69}" type="datetimeFigureOut">
               <a:rPr lang="en-US" smtClean="0"/>
-              <a:t>12/18/2024</a:t>
+              <a:t>12/19/2024</a:t>
             </a:fld>
             <a:endParaRPr lang="en-US"/>
           </a:p>
@@ -671,7 +671,7 @@
           <a:p>
             <a:fld id="{2E7CC9F0-B487-409B-B9EC-A5FEB68BFF69}" type="datetimeFigureOut">
               <a:rPr lang="en-US" smtClean="0"/>
-              <a:t>12/18/2024</a:t>
+              <a:t>12/19/2024</a:t>
             </a:fld>
             <a:endParaRPr lang="en-US"/>
           </a:p>
@@ -869,7 +869,7 @@
           <a:p>
             <a:fld id="{2E7CC9F0-B487-409B-B9EC-A5FEB68BFF69}" type="datetimeFigureOut">
               <a:rPr lang="en-US" smtClean="0"/>
-              <a:t>12/18/2024</a:t>
+              <a:t>12/19/2024</a:t>
             </a:fld>
             <a:endParaRPr lang="en-US"/>
           </a:p>
@@ -1144,7 +1144,7 @@
           <a:p>
             <a:fld id="{2E7CC9F0-B487-409B-B9EC-A5FEB68BFF69}" type="datetimeFigureOut">
               <a:rPr lang="en-US" smtClean="0"/>
-              <a:t>12/18/2024</a:t>
+              <a:t>12/19/2024</a:t>
             </a:fld>
             <a:endParaRPr lang="en-US"/>
           </a:p>
@@ -1409,7 +1409,7 @@
           <a:p>
             <a:fld id="{2E7CC9F0-B487-409B-B9EC-A5FEB68BFF69}" type="datetimeFigureOut">
               <a:rPr lang="en-US" smtClean="0"/>
-              <a:t>12/18/2024</a:t>
+              <a:t>12/19/2024</a:t>
             </a:fld>
             <a:endParaRPr lang="en-US"/>
           </a:p>
@@ -1821,7 +1821,7 @@
           <a:p>
             <a:fld id="{2E7CC9F0-B487-409B-B9EC-A5FEB68BFF69}" type="datetimeFigureOut">
               <a:rPr lang="en-US" smtClean="0"/>
-              <a:t>12/18/2024</a:t>
+              <a:t>12/19/2024</a:t>
             </a:fld>
             <a:endParaRPr lang="en-US"/>
           </a:p>
@@ -1962,7 +1962,7 @@
           <a:p>
             <a:fld id="{2E7CC9F0-B487-409B-B9EC-A5FEB68BFF69}" type="datetimeFigureOut">
               <a:rPr lang="en-US" smtClean="0"/>
-              <a:t>12/18/2024</a:t>
+              <a:t>12/19/2024</a:t>
             </a:fld>
             <a:endParaRPr lang="en-US"/>
           </a:p>
@@ -2075,7 +2075,7 @@
           <a:p>
             <a:fld id="{2E7CC9F0-B487-409B-B9EC-A5FEB68BFF69}" type="datetimeFigureOut">
               <a:rPr lang="en-US" smtClean="0"/>
-              <a:t>12/18/2024</a:t>
+              <a:t>12/19/2024</a:t>
             </a:fld>
             <a:endParaRPr lang="en-US"/>
           </a:p>
@@ -2386,7 +2386,7 @@
           <a:p>
             <a:fld id="{2E7CC9F0-B487-409B-B9EC-A5FEB68BFF69}" type="datetimeFigureOut">
               <a:rPr lang="en-US" smtClean="0"/>
-              <a:t>12/18/2024</a:t>
+              <a:t>12/19/2024</a:t>
             </a:fld>
             <a:endParaRPr lang="en-US"/>
           </a:p>
@@ -2674,7 +2674,7 @@
           <a:p>
             <a:fld id="{2E7CC9F0-B487-409B-B9EC-A5FEB68BFF69}" type="datetimeFigureOut">
               <a:rPr lang="en-US" smtClean="0"/>
-              <a:t>12/18/2024</a:t>
+              <a:t>12/19/2024</a:t>
             </a:fld>
             <a:endParaRPr lang="en-US"/>
           </a:p>
@@ -2915,7 +2915,7 @@
           <a:p>
             <a:fld id="{2E7CC9F0-B487-409B-B9EC-A5FEB68BFF69}" type="datetimeFigureOut">
               <a:rPr lang="en-US" smtClean="0"/>
-              <a:t>12/18/2024</a:t>
+              <a:t>12/19/2024</a:t>
             </a:fld>
             <a:endParaRPr lang="en-US"/>
           </a:p>
@@ -3853,13 +3853,13 @@
           <a:p>
             <a:r>
               <a:rPr lang="en-US" dirty="0"/>
-              <a:t>2 = LONG DELAY (Not Implemented)</a:t>
+              <a:t>2 = LONG DELAY</a:t>
             </a:r>
           </a:p>
           <a:p>
             <a:r>
               <a:rPr lang="en-US" dirty="0"/>
-              <a:t>3 = GOTO (Not Implemented)</a:t>
+              <a:t>3 = GOTO</a:t>
             </a:r>
           </a:p>
           <a:p>
@@ -3949,26 +3949,29 @@
         </p:nvSpPr>
         <p:spPr/>
         <p:txBody>
-          <a:bodyPr/>
+          <a:bodyPr>
+            <a:normAutofit lnSpcReduction="10000"/>
+          </a:bodyPr>
           <a:lstStyle/>
           <a:p>
             <a:r>
               <a:rPr lang="en-US" dirty="0"/>
-              <a:t>Currently 10 bytes must be transmitted at a time. Should </a:t>
-            </a:r>
-            <a:r>
-              <a:rPr lang="en-US"/>
-              <a:t>add timeout</a:t>
-            </a:r>
+              <a:t>Currently 10 bytes must be transmitted at a time. Should add timeout</a:t>
+            </a:r>
+          </a:p>
+          <a:p>
+            <a:r>
+              <a:rPr lang="en-US" dirty="0"/>
+              <a:t>4-bit (16) UART commands are possible</a:t>
+            </a:r>
+          </a:p>
+          <a:p>
             <a:endParaRPr lang="en-US" dirty="0"/>
           </a:p>
           <a:p>
-            <a:endParaRPr lang="en-US" dirty="0"/>
-          </a:p>
-          <a:p>
             <a:r>
               <a:rPr lang="en-US" dirty="0"/>
-              <a:t>0 = Read from RAM</a:t>
+              <a:t>0 = Read from RAM (Not Implemented)</a:t>
             </a:r>
           </a:p>
           <a:p>
@@ -3992,7 +3995,7 @@
           <a:p>
             <a:r>
               <a:rPr lang="en-US" dirty="0"/>
-              <a:t>4 = </a:t>
+              <a:t>4 = ???</a:t>
             </a:r>
           </a:p>
         </p:txBody>

</xml_diff>